<commit_message>
Definicion Task y TaskDefinition
</commit_message>
<xml_diff>
--- a/doc/Didara Domains.pptx
+++ b/doc/Didara Domains.pptx
@@ -7,6 +7,7 @@
   <p:sldIdLst>
     <p:sldId id="256" r:id="rId2"/>
     <p:sldId id="257" r:id="rId3"/>
+    <p:sldId id="258" r:id="rId4"/>
   </p:sldIdLst>
   <p:sldSz cx="12192000" cy="6858000"/>
   <p:notesSz cx="6858000" cy="9144000"/>
@@ -105,6 +106,11 @@
       </a:defRPr>
     </a:lvl9pPr>
   </p:defaultTextStyle>
+  <p:extLst>
+    <p:ext uri="{EFAFB233-063F-42B5-8137-9DF3F51BA10A}">
+      <p15:sldGuideLst xmlns:p15="http://schemas.microsoft.com/office/powerpoint/2012/main"/>
+    </p:ext>
+  </p:extLst>
 </p:presentation>
 </file>
 
@@ -239,7 +245,7 @@
           <a:p>
             <a:fld id="{44B739FF-4C10-4262-9C12-8415FF676D54}" type="datetimeFigureOut">
               <a:rPr lang="es-ES" smtClean="0"/>
-              <a:t>07/03/2016</a:t>
+              <a:t>12/03/2016</a:t>
             </a:fld>
             <a:endParaRPr lang="es-ES"/>
           </a:p>
@@ -409,7 +415,7 @@
           <a:p>
             <a:fld id="{44B739FF-4C10-4262-9C12-8415FF676D54}" type="datetimeFigureOut">
               <a:rPr lang="es-ES" smtClean="0"/>
-              <a:t>07/03/2016</a:t>
+              <a:t>12/03/2016</a:t>
             </a:fld>
             <a:endParaRPr lang="es-ES"/>
           </a:p>
@@ -589,7 +595,7 @@
           <a:p>
             <a:fld id="{44B739FF-4C10-4262-9C12-8415FF676D54}" type="datetimeFigureOut">
               <a:rPr lang="es-ES" smtClean="0"/>
-              <a:t>07/03/2016</a:t>
+              <a:t>12/03/2016</a:t>
             </a:fld>
             <a:endParaRPr lang="es-ES"/>
           </a:p>
@@ -759,7 +765,7 @@
           <a:p>
             <a:fld id="{44B739FF-4C10-4262-9C12-8415FF676D54}" type="datetimeFigureOut">
               <a:rPr lang="es-ES" smtClean="0"/>
-              <a:t>07/03/2016</a:t>
+              <a:t>12/03/2016</a:t>
             </a:fld>
             <a:endParaRPr lang="es-ES"/>
           </a:p>
@@ -1005,7 +1011,7 @@
           <a:p>
             <a:fld id="{44B739FF-4C10-4262-9C12-8415FF676D54}" type="datetimeFigureOut">
               <a:rPr lang="es-ES" smtClean="0"/>
-              <a:t>07/03/2016</a:t>
+              <a:t>12/03/2016</a:t>
             </a:fld>
             <a:endParaRPr lang="es-ES"/>
           </a:p>
@@ -1237,7 +1243,7 @@
           <a:p>
             <a:fld id="{44B739FF-4C10-4262-9C12-8415FF676D54}" type="datetimeFigureOut">
               <a:rPr lang="es-ES" smtClean="0"/>
-              <a:t>07/03/2016</a:t>
+              <a:t>12/03/2016</a:t>
             </a:fld>
             <a:endParaRPr lang="es-ES"/>
           </a:p>
@@ -1604,7 +1610,7 @@
           <a:p>
             <a:fld id="{44B739FF-4C10-4262-9C12-8415FF676D54}" type="datetimeFigureOut">
               <a:rPr lang="es-ES" smtClean="0"/>
-              <a:t>07/03/2016</a:t>
+              <a:t>12/03/2016</a:t>
             </a:fld>
             <a:endParaRPr lang="es-ES"/>
           </a:p>
@@ -1722,7 +1728,7 @@
           <a:p>
             <a:fld id="{44B739FF-4C10-4262-9C12-8415FF676D54}" type="datetimeFigureOut">
               <a:rPr lang="es-ES" smtClean="0"/>
-              <a:t>07/03/2016</a:t>
+              <a:t>12/03/2016</a:t>
             </a:fld>
             <a:endParaRPr lang="es-ES"/>
           </a:p>
@@ -1817,7 +1823,7 @@
           <a:p>
             <a:fld id="{44B739FF-4C10-4262-9C12-8415FF676D54}" type="datetimeFigureOut">
               <a:rPr lang="es-ES" smtClean="0"/>
-              <a:t>07/03/2016</a:t>
+              <a:t>12/03/2016</a:t>
             </a:fld>
             <a:endParaRPr lang="es-ES"/>
           </a:p>
@@ -2094,7 +2100,7 @@
           <a:p>
             <a:fld id="{44B739FF-4C10-4262-9C12-8415FF676D54}" type="datetimeFigureOut">
               <a:rPr lang="es-ES" smtClean="0"/>
-              <a:t>07/03/2016</a:t>
+              <a:t>12/03/2016</a:t>
             </a:fld>
             <a:endParaRPr lang="es-ES"/>
           </a:p>
@@ -2347,7 +2353,7 @@
           <a:p>
             <a:fld id="{44B739FF-4C10-4262-9C12-8415FF676D54}" type="datetimeFigureOut">
               <a:rPr lang="es-ES" smtClean="0"/>
-              <a:t>07/03/2016</a:t>
+              <a:t>12/03/2016</a:t>
             </a:fld>
             <a:endParaRPr lang="es-ES"/>
           </a:p>
@@ -2560,7 +2566,7 @@
           <a:p>
             <a:fld id="{44B739FF-4C10-4262-9C12-8415FF676D54}" type="datetimeFigureOut">
               <a:rPr lang="es-ES" smtClean="0"/>
-              <a:t>07/03/2016</a:t>
+              <a:t>12/03/2016</a:t>
             </a:fld>
             <a:endParaRPr lang="es-ES"/>
           </a:p>
@@ -3137,7 +3143,6 @@
               <a:rPr lang="es-ES" sz="1200" dirty="0" smtClean="0"/>
               <a:t>&gt;&gt;</a:t>
             </a:r>
-            <a:endParaRPr lang="es-ES" sz="1200" dirty="0" smtClean="0"/>
           </a:p>
           <a:p>
             <a:pPr algn="ctr"/>
@@ -3447,7 +3452,6 @@
               <a:rPr lang="es-ES" sz="1200" dirty="0" smtClean="0"/>
               <a:t>&gt;&gt;</a:t>
             </a:r>
-            <a:endParaRPr lang="es-ES" sz="1200" dirty="0" smtClean="0"/>
           </a:p>
           <a:p>
             <a:pPr algn="ctr"/>
@@ -3763,7 +3767,6 @@
               <a:rPr lang="es-ES" sz="1200" dirty="0" smtClean="0"/>
               <a:t>&gt;&gt;</a:t>
             </a:r>
-            <a:endParaRPr lang="es-ES" sz="1200" dirty="0" smtClean="0"/>
           </a:p>
           <a:p>
             <a:pPr algn="ctr"/>
@@ -3917,7 +3920,6 @@
               <a:rPr lang="es-ES" sz="1200" dirty="0" smtClean="0"/>
               <a:t>&gt;&gt;</a:t>
             </a:r>
-            <a:endParaRPr lang="es-ES" sz="1200" dirty="0" smtClean="0"/>
           </a:p>
           <a:p>
             <a:pPr algn="ctr"/>
@@ -4500,7 +4502,6 @@
               <a:rPr lang="es-ES" sz="1100" dirty="0" smtClean="0"/>
               <a:t>&gt;&gt;</a:t>
             </a:r>
-            <a:endParaRPr lang="es-ES" sz="1100" dirty="0" smtClean="0"/>
           </a:p>
           <a:p>
             <a:pPr algn="ctr"/>
@@ -4704,6 +4705,447 @@
     <p:extLst>
       <p:ext uri="{BB962C8B-B14F-4D97-AF65-F5344CB8AC3E}">
         <p14:creationId xmlns:p14="http://schemas.microsoft.com/office/powerpoint/2010/main" val="976514229"/>
+      </p:ext>
+    </p:extLst>
+  </p:cSld>
+  <p:clrMapOvr>
+    <a:masterClrMapping/>
+  </p:clrMapOvr>
+</p:sld>
+</file>
+
+<file path=ppt/slides/slide3.xml><?xml version="1.0" encoding="utf-8"?>
+<p:sld xmlns:a="http://schemas.openxmlformats.org/drawingml/2006/main" xmlns:r="http://schemas.openxmlformats.org/officeDocument/2006/relationships" xmlns:p="http://schemas.openxmlformats.org/presentationml/2006/main">
+  <p:cSld>
+    <p:spTree>
+      <p:nvGrpSpPr>
+        <p:cNvPr id="1" name=""/>
+        <p:cNvGrpSpPr/>
+        <p:nvPr/>
+      </p:nvGrpSpPr>
+      <p:grpSpPr>
+        <a:xfrm>
+          <a:off x="0" y="0"/>
+          <a:ext cx="0" cy="0"/>
+          <a:chOff x="0" y="0"/>
+          <a:chExt cx="0" cy="0"/>
+        </a:xfrm>
+      </p:grpSpPr>
+      <p:sp>
+        <p:nvSpPr>
+          <p:cNvPr id="4" name="Título 3"/>
+          <p:cNvSpPr>
+            <a:spLocks noGrp="1"/>
+          </p:cNvSpPr>
+          <p:nvPr>
+            <p:ph type="title"/>
+          </p:nvPr>
+        </p:nvSpPr>
+        <p:spPr/>
+        <p:txBody>
+          <a:bodyPr/>
+          <a:lstStyle/>
+          <a:p>
+            <a:endParaRPr lang="es-ES"/>
+          </a:p>
+        </p:txBody>
+      </p:sp>
+      <p:cxnSp>
+        <p:nvCxnSpPr>
+          <p:cNvPr id="9" name="Conector recto 8"/>
+          <p:cNvCxnSpPr/>
+          <p:nvPr/>
+        </p:nvCxnSpPr>
+        <p:spPr>
+          <a:xfrm>
+            <a:off x="838200" y="4084544"/>
+            <a:ext cx="10515600" cy="0"/>
+          </a:xfrm>
+          <a:prstGeom prst="line">
+            <a:avLst/>
+          </a:prstGeom>
+          <a:ln>
+            <a:solidFill>
+              <a:srgbClr val="C00000"/>
+            </a:solidFill>
+            <a:prstDash val="dash"/>
+          </a:ln>
+        </p:spPr>
+        <p:style>
+          <a:lnRef idx="1">
+            <a:schemeClr val="dk1"/>
+          </a:lnRef>
+          <a:fillRef idx="0">
+            <a:schemeClr val="dk1"/>
+          </a:fillRef>
+          <a:effectRef idx="0">
+            <a:schemeClr val="dk1"/>
+          </a:effectRef>
+          <a:fontRef idx="minor">
+            <a:schemeClr val="tx1"/>
+          </a:fontRef>
+        </p:style>
+      </p:cxnSp>
+      <p:cxnSp>
+        <p:nvCxnSpPr>
+          <p:cNvPr id="11" name="Conector recto 10"/>
+          <p:cNvCxnSpPr/>
+          <p:nvPr/>
+        </p:nvCxnSpPr>
+        <p:spPr>
+          <a:xfrm>
+            <a:off x="6096000" y="1822076"/>
+            <a:ext cx="0" cy="4524935"/>
+          </a:xfrm>
+          <a:prstGeom prst="line">
+            <a:avLst/>
+          </a:prstGeom>
+          <a:ln>
+            <a:solidFill>
+              <a:srgbClr val="C00000"/>
+            </a:solidFill>
+            <a:prstDash val="dash"/>
+          </a:ln>
+        </p:spPr>
+        <p:style>
+          <a:lnRef idx="1">
+            <a:schemeClr val="dk1"/>
+          </a:lnRef>
+          <a:fillRef idx="0">
+            <a:schemeClr val="dk1"/>
+          </a:fillRef>
+          <a:effectRef idx="0">
+            <a:schemeClr val="dk1"/>
+          </a:effectRef>
+          <a:fontRef idx="minor">
+            <a:schemeClr val="tx1"/>
+          </a:fontRef>
+        </p:style>
+      </p:cxnSp>
+      <p:sp>
+        <p:nvSpPr>
+          <p:cNvPr id="12" name="Rectángulo 11"/>
+          <p:cNvSpPr/>
+          <p:nvPr/>
+        </p:nvSpPr>
+        <p:spPr>
+          <a:xfrm>
+            <a:off x="7368988" y="2514600"/>
+            <a:ext cx="1949824" cy="833718"/>
+          </a:xfrm>
+          <a:prstGeom prst="rect">
+            <a:avLst/>
+          </a:prstGeom>
+        </p:spPr>
+        <p:style>
+          <a:lnRef idx="1">
+            <a:schemeClr val="accent4"/>
+          </a:lnRef>
+          <a:fillRef idx="2">
+            <a:schemeClr val="accent4"/>
+          </a:fillRef>
+          <a:effectRef idx="1">
+            <a:schemeClr val="accent4"/>
+          </a:effectRef>
+          <a:fontRef idx="minor">
+            <a:schemeClr val="dk1"/>
+          </a:fontRef>
+        </p:style>
+        <p:txBody>
+          <a:bodyPr rtlCol="0" anchor="ctr"/>
+          <a:lstStyle/>
+          <a:p>
+            <a:pPr algn="ctr"/>
+            <a:r>
+              <a:rPr lang="en-US" dirty="0" smtClean="0"/>
+              <a:t>Human Task Specification</a:t>
+            </a:r>
+            <a:endParaRPr lang="en-US" dirty="0"/>
+          </a:p>
+        </p:txBody>
+      </p:sp>
+      <p:sp>
+        <p:nvSpPr>
+          <p:cNvPr id="13" name="Rectángulo 12"/>
+          <p:cNvSpPr/>
+          <p:nvPr/>
+        </p:nvSpPr>
+        <p:spPr>
+          <a:xfrm>
+            <a:off x="7368988" y="5082988"/>
+            <a:ext cx="1949824" cy="833718"/>
+          </a:xfrm>
+          <a:prstGeom prst="rect">
+            <a:avLst/>
+          </a:prstGeom>
+        </p:spPr>
+        <p:style>
+          <a:lnRef idx="1">
+            <a:schemeClr val="accent4"/>
+          </a:lnRef>
+          <a:fillRef idx="2">
+            <a:schemeClr val="accent4"/>
+          </a:fillRef>
+          <a:effectRef idx="1">
+            <a:schemeClr val="accent4"/>
+          </a:effectRef>
+          <a:fontRef idx="minor">
+            <a:schemeClr val="dk1"/>
+          </a:fontRef>
+        </p:style>
+        <p:txBody>
+          <a:bodyPr rtlCol="0" anchor="ctr"/>
+          <a:lstStyle/>
+          <a:p>
+            <a:pPr algn="ctr"/>
+            <a:r>
+              <a:rPr lang="en-US" dirty="0" smtClean="0"/>
+              <a:t>Human Task Instance</a:t>
+            </a:r>
+            <a:endParaRPr lang="en-US" dirty="0"/>
+          </a:p>
+        </p:txBody>
+      </p:sp>
+      <p:sp>
+        <p:nvSpPr>
+          <p:cNvPr id="14" name="Rectángulo 13"/>
+          <p:cNvSpPr/>
+          <p:nvPr/>
+        </p:nvSpPr>
+        <p:spPr>
+          <a:xfrm>
+            <a:off x="2568388" y="2514600"/>
+            <a:ext cx="1949824" cy="833718"/>
+          </a:xfrm>
+          <a:prstGeom prst="rect">
+            <a:avLst/>
+          </a:prstGeom>
+        </p:spPr>
+        <p:style>
+          <a:lnRef idx="1">
+            <a:schemeClr val="accent4"/>
+          </a:lnRef>
+          <a:fillRef idx="2">
+            <a:schemeClr val="accent4"/>
+          </a:fillRef>
+          <a:effectRef idx="1">
+            <a:schemeClr val="accent4"/>
+          </a:effectRef>
+          <a:fontRef idx="minor">
+            <a:schemeClr val="dk1"/>
+          </a:fontRef>
+        </p:style>
+        <p:txBody>
+          <a:bodyPr rtlCol="0" anchor="ctr"/>
+          <a:lstStyle/>
+          <a:p>
+            <a:pPr algn="ctr"/>
+            <a:r>
+              <a:rPr lang="en-US" dirty="0" smtClean="0"/>
+              <a:t>Process Specification</a:t>
+            </a:r>
+            <a:endParaRPr lang="en-US" dirty="0"/>
+          </a:p>
+        </p:txBody>
+      </p:sp>
+      <p:sp>
+        <p:nvSpPr>
+          <p:cNvPr id="15" name="Rectángulo 14"/>
+          <p:cNvSpPr/>
+          <p:nvPr/>
+        </p:nvSpPr>
+        <p:spPr>
+          <a:xfrm>
+            <a:off x="2568388" y="5082988"/>
+            <a:ext cx="1949824" cy="833718"/>
+          </a:xfrm>
+          <a:prstGeom prst="rect">
+            <a:avLst/>
+          </a:prstGeom>
+        </p:spPr>
+        <p:style>
+          <a:lnRef idx="1">
+            <a:schemeClr val="accent4"/>
+          </a:lnRef>
+          <a:fillRef idx="2">
+            <a:schemeClr val="accent4"/>
+          </a:fillRef>
+          <a:effectRef idx="1">
+            <a:schemeClr val="accent4"/>
+          </a:effectRef>
+          <a:fontRef idx="minor">
+            <a:schemeClr val="dk1"/>
+          </a:fontRef>
+        </p:style>
+        <p:txBody>
+          <a:bodyPr rtlCol="0" anchor="ctr"/>
+          <a:lstStyle/>
+          <a:p>
+            <a:pPr algn="ctr"/>
+            <a:r>
+              <a:rPr lang="en-US" dirty="0" smtClean="0"/>
+              <a:t>Process Instance</a:t>
+            </a:r>
+            <a:endParaRPr lang="en-US" dirty="0"/>
+          </a:p>
+        </p:txBody>
+      </p:sp>
+      <p:cxnSp>
+        <p:nvCxnSpPr>
+          <p:cNvPr id="17" name="Conector recto 16"/>
+          <p:cNvCxnSpPr>
+            <a:stCxn id="14" idx="3"/>
+            <a:endCxn id="12" idx="1"/>
+          </p:cNvCxnSpPr>
+          <p:nvPr/>
+        </p:nvCxnSpPr>
+        <p:spPr>
+          <a:xfrm>
+            <a:off x="4518212" y="2931459"/>
+            <a:ext cx="2850776" cy="0"/>
+          </a:xfrm>
+          <a:prstGeom prst="line">
+            <a:avLst/>
+          </a:prstGeom>
+          <a:ln w="38100">
+            <a:solidFill>
+              <a:srgbClr val="C00000"/>
+            </a:solidFill>
+          </a:ln>
+        </p:spPr>
+        <p:style>
+          <a:lnRef idx="1">
+            <a:schemeClr val="accent4"/>
+          </a:lnRef>
+          <a:fillRef idx="2">
+            <a:schemeClr val="accent4"/>
+          </a:fillRef>
+          <a:effectRef idx="1">
+            <a:schemeClr val="accent4"/>
+          </a:effectRef>
+          <a:fontRef idx="minor">
+            <a:schemeClr val="dk1"/>
+          </a:fontRef>
+        </p:style>
+      </p:cxnSp>
+      <p:cxnSp>
+        <p:nvCxnSpPr>
+          <p:cNvPr id="19" name="Conector recto 18"/>
+          <p:cNvCxnSpPr>
+            <a:stCxn id="12" idx="2"/>
+            <a:endCxn id="13" idx="0"/>
+          </p:cNvCxnSpPr>
+          <p:nvPr/>
+        </p:nvCxnSpPr>
+        <p:spPr>
+          <a:xfrm>
+            <a:off x="8343900" y="3348318"/>
+            <a:ext cx="0" cy="1734670"/>
+          </a:xfrm>
+          <a:prstGeom prst="line">
+            <a:avLst/>
+          </a:prstGeom>
+          <a:ln w="38100">
+            <a:solidFill>
+              <a:srgbClr val="C00000"/>
+            </a:solidFill>
+          </a:ln>
+        </p:spPr>
+        <p:style>
+          <a:lnRef idx="1">
+            <a:schemeClr val="accent4"/>
+          </a:lnRef>
+          <a:fillRef idx="2">
+            <a:schemeClr val="accent4"/>
+          </a:fillRef>
+          <a:effectRef idx="1">
+            <a:schemeClr val="accent4"/>
+          </a:effectRef>
+          <a:fontRef idx="minor">
+            <a:schemeClr val="dk1"/>
+          </a:fontRef>
+        </p:style>
+      </p:cxnSp>
+      <p:cxnSp>
+        <p:nvCxnSpPr>
+          <p:cNvPr id="21" name="Conector recto 20"/>
+          <p:cNvCxnSpPr>
+            <a:stCxn id="15" idx="3"/>
+            <a:endCxn id="13" idx="1"/>
+          </p:cNvCxnSpPr>
+          <p:nvPr/>
+        </p:nvCxnSpPr>
+        <p:spPr>
+          <a:xfrm>
+            <a:off x="4518212" y="5499847"/>
+            <a:ext cx="2850776" cy="0"/>
+          </a:xfrm>
+          <a:prstGeom prst="line">
+            <a:avLst/>
+          </a:prstGeom>
+          <a:ln w="38100">
+            <a:solidFill>
+              <a:srgbClr val="C00000"/>
+            </a:solidFill>
+          </a:ln>
+        </p:spPr>
+        <p:style>
+          <a:lnRef idx="1">
+            <a:schemeClr val="accent4"/>
+          </a:lnRef>
+          <a:fillRef idx="2">
+            <a:schemeClr val="accent4"/>
+          </a:fillRef>
+          <a:effectRef idx="1">
+            <a:schemeClr val="accent4"/>
+          </a:effectRef>
+          <a:fontRef idx="minor">
+            <a:schemeClr val="dk1"/>
+          </a:fontRef>
+        </p:style>
+      </p:cxnSp>
+      <p:cxnSp>
+        <p:nvCxnSpPr>
+          <p:cNvPr id="23" name="Conector recto 22"/>
+          <p:cNvCxnSpPr>
+            <a:stCxn id="14" idx="2"/>
+            <a:endCxn id="15" idx="0"/>
+          </p:cNvCxnSpPr>
+          <p:nvPr/>
+        </p:nvCxnSpPr>
+        <p:spPr>
+          <a:xfrm>
+            <a:off x="3543300" y="3348318"/>
+            <a:ext cx="0" cy="1734670"/>
+          </a:xfrm>
+          <a:prstGeom prst="line">
+            <a:avLst/>
+          </a:prstGeom>
+          <a:ln w="38100">
+            <a:solidFill>
+              <a:srgbClr val="C00000"/>
+            </a:solidFill>
+          </a:ln>
+        </p:spPr>
+        <p:style>
+          <a:lnRef idx="1">
+            <a:schemeClr val="accent4"/>
+          </a:lnRef>
+          <a:fillRef idx="2">
+            <a:schemeClr val="accent4"/>
+          </a:fillRef>
+          <a:effectRef idx="1">
+            <a:schemeClr val="accent4"/>
+          </a:effectRef>
+          <a:fontRef idx="minor">
+            <a:schemeClr val="dk1"/>
+          </a:fontRef>
+        </p:style>
+      </p:cxnSp>
+    </p:spTree>
+    <p:extLst>
+      <p:ext uri="{BB962C8B-B14F-4D97-AF65-F5344CB8AC3E}">
+        <p14:creationId xmlns:p14="http://schemas.microsoft.com/office/powerpoint/2010/main" val="1203830304"/>
       </p:ext>
     </p:extLst>
   </p:cSld>

</xml_diff>

<commit_message>
Implementacion de Servicio de Aplicacion
</commit_message>
<xml_diff>
--- a/doc/Didara Domains.pptx
+++ b/doc/Didara Domains.pptx
@@ -6,7 +6,7 @@
   </p:sldMasterIdLst>
   <p:sldIdLst>
     <p:sldId id="256" r:id="rId2"/>
-    <p:sldId id="257" r:id="rId3"/>
+    <p:sldId id="259" r:id="rId3"/>
     <p:sldId id="258" r:id="rId4"/>
   </p:sldIdLst>
   <p:sldSz cx="12192000" cy="6858000"/>
@@ -245,7 +245,7 @@
           <a:p>
             <a:fld id="{44B739FF-4C10-4262-9C12-8415FF676D54}" type="datetimeFigureOut">
               <a:rPr lang="es-ES" smtClean="0"/>
-              <a:t>12/03/2016</a:t>
+              <a:t>14/03/2016</a:t>
             </a:fld>
             <a:endParaRPr lang="es-ES"/>
           </a:p>
@@ -415,7 +415,7 @@
           <a:p>
             <a:fld id="{44B739FF-4C10-4262-9C12-8415FF676D54}" type="datetimeFigureOut">
               <a:rPr lang="es-ES" smtClean="0"/>
-              <a:t>12/03/2016</a:t>
+              <a:t>14/03/2016</a:t>
             </a:fld>
             <a:endParaRPr lang="es-ES"/>
           </a:p>
@@ -595,7 +595,7 @@
           <a:p>
             <a:fld id="{44B739FF-4C10-4262-9C12-8415FF676D54}" type="datetimeFigureOut">
               <a:rPr lang="es-ES" smtClean="0"/>
-              <a:t>12/03/2016</a:t>
+              <a:t>14/03/2016</a:t>
             </a:fld>
             <a:endParaRPr lang="es-ES"/>
           </a:p>
@@ -765,7 +765,7 @@
           <a:p>
             <a:fld id="{44B739FF-4C10-4262-9C12-8415FF676D54}" type="datetimeFigureOut">
               <a:rPr lang="es-ES" smtClean="0"/>
-              <a:t>12/03/2016</a:t>
+              <a:t>14/03/2016</a:t>
             </a:fld>
             <a:endParaRPr lang="es-ES"/>
           </a:p>
@@ -1011,7 +1011,7 @@
           <a:p>
             <a:fld id="{44B739FF-4C10-4262-9C12-8415FF676D54}" type="datetimeFigureOut">
               <a:rPr lang="es-ES" smtClean="0"/>
-              <a:t>12/03/2016</a:t>
+              <a:t>14/03/2016</a:t>
             </a:fld>
             <a:endParaRPr lang="es-ES"/>
           </a:p>
@@ -1243,7 +1243,7 @@
           <a:p>
             <a:fld id="{44B739FF-4C10-4262-9C12-8415FF676D54}" type="datetimeFigureOut">
               <a:rPr lang="es-ES" smtClean="0"/>
-              <a:t>12/03/2016</a:t>
+              <a:t>14/03/2016</a:t>
             </a:fld>
             <a:endParaRPr lang="es-ES"/>
           </a:p>
@@ -1610,7 +1610,7 @@
           <a:p>
             <a:fld id="{44B739FF-4C10-4262-9C12-8415FF676D54}" type="datetimeFigureOut">
               <a:rPr lang="es-ES" smtClean="0"/>
-              <a:t>12/03/2016</a:t>
+              <a:t>14/03/2016</a:t>
             </a:fld>
             <a:endParaRPr lang="es-ES"/>
           </a:p>
@@ -1728,7 +1728,7 @@
           <a:p>
             <a:fld id="{44B739FF-4C10-4262-9C12-8415FF676D54}" type="datetimeFigureOut">
               <a:rPr lang="es-ES" smtClean="0"/>
-              <a:t>12/03/2016</a:t>
+              <a:t>14/03/2016</a:t>
             </a:fld>
             <a:endParaRPr lang="es-ES"/>
           </a:p>
@@ -1823,7 +1823,7 @@
           <a:p>
             <a:fld id="{44B739FF-4C10-4262-9C12-8415FF676D54}" type="datetimeFigureOut">
               <a:rPr lang="es-ES" smtClean="0"/>
-              <a:t>12/03/2016</a:t>
+              <a:t>14/03/2016</a:t>
             </a:fld>
             <a:endParaRPr lang="es-ES"/>
           </a:p>
@@ -2100,7 +2100,7 @@
           <a:p>
             <a:fld id="{44B739FF-4C10-4262-9C12-8415FF676D54}" type="datetimeFigureOut">
               <a:rPr lang="es-ES" smtClean="0"/>
-              <a:t>12/03/2016</a:t>
+              <a:t>14/03/2016</a:t>
             </a:fld>
             <a:endParaRPr lang="es-ES"/>
           </a:p>
@@ -2353,7 +2353,7 @@
           <a:p>
             <a:fld id="{44B739FF-4C10-4262-9C12-8415FF676D54}" type="datetimeFigureOut">
               <a:rPr lang="es-ES" smtClean="0"/>
-              <a:t>12/03/2016</a:t>
+              <a:t>14/03/2016</a:t>
             </a:fld>
             <a:endParaRPr lang="es-ES"/>
           </a:p>
@@ -2566,7 +2566,7 @@
           <a:p>
             <a:fld id="{44B739FF-4C10-4262-9C12-8415FF676D54}" type="datetimeFigureOut">
               <a:rPr lang="es-ES" smtClean="0"/>
-              <a:t>12/03/2016</a:t>
+              <a:t>14/03/2016</a:t>
             </a:fld>
             <a:endParaRPr lang="es-ES"/>
           </a:p>
@@ -2973,45 +2973,14 @@
       </p:grpSpPr>
       <p:sp>
         <p:nvSpPr>
-          <p:cNvPr id="4" name="Título 3"/>
-          <p:cNvSpPr>
-            <a:spLocks noGrp="1"/>
-          </p:cNvSpPr>
-          <p:nvPr>
-            <p:ph type="title"/>
-          </p:nvPr>
-        </p:nvSpPr>
-        <p:spPr/>
-        <p:txBody>
-          <a:bodyPr/>
-          <a:lstStyle/>
-          <a:p>
-            <a:r>
-              <a:rPr lang="es-ES" dirty="0" err="1" smtClean="0"/>
-              <a:t>Process</a:t>
-            </a:r>
-            <a:r>
-              <a:rPr lang="es-ES" dirty="0" smtClean="0"/>
-              <a:t> </a:t>
-            </a:r>
-            <a:r>
-              <a:rPr lang="es-ES" dirty="0" err="1" smtClean="0"/>
-              <a:t>Domain</a:t>
-            </a:r>
-            <a:endParaRPr lang="es-ES" dirty="0"/>
-          </a:p>
-        </p:txBody>
-      </p:sp>
-      <p:sp>
-        <p:nvSpPr>
           <p:cNvPr id="5" name="Rectángulo 4"/>
           <p:cNvSpPr/>
           <p:nvPr/>
         </p:nvSpPr>
         <p:spPr>
           <a:xfrm>
-            <a:off x="2649071" y="2030506"/>
-            <a:ext cx="8704729" cy="4249270"/>
+            <a:off x="309282" y="188259"/>
+            <a:ext cx="11551023" cy="6521823"/>
           </a:xfrm>
           <a:prstGeom prst="rect">
             <a:avLst/>
@@ -3037,7 +3006,11 @@
           <a:p>
             <a:r>
               <a:rPr lang="en-US" dirty="0" smtClean="0"/>
-              <a:t>Process Domain</a:t>
+              <a:t>Process </a:t>
+            </a:r>
+            <a:r>
+              <a:rPr lang="en-US" dirty="0" smtClean="0"/>
+              <a:t>Domain Model</a:t>
             </a:r>
             <a:endParaRPr lang="en-US" dirty="0"/>
           </a:p>
@@ -3051,7 +3024,7 @@
         </p:nvSpPr>
         <p:spPr>
           <a:xfrm>
-            <a:off x="1754841" y="2678625"/>
+            <a:off x="676275" y="839170"/>
             <a:ext cx="1788459" cy="612260"/>
           </a:xfrm>
           <a:prstGeom prst="roundRect">
@@ -3794,8 +3767,8 @@
         </p:nvSpPr>
         <p:spPr>
           <a:xfrm>
-            <a:off x="4038600" y="2362621"/>
-            <a:ext cx="3536577" cy="1850791"/>
+            <a:off x="2831728" y="2362621"/>
+            <a:ext cx="4743450" cy="1850791"/>
           </a:xfrm>
           <a:prstGeom prst="roundRect">
             <a:avLst>
@@ -4319,7 +4292,7 @@
         </p:nvSpPr>
         <p:spPr>
           <a:xfrm>
-            <a:off x="1754840" y="3390900"/>
+            <a:off x="676275" y="1628000"/>
             <a:ext cx="1788459" cy="612260"/>
           </a:xfrm>
           <a:prstGeom prst="roundRect">
@@ -4521,6 +4494,581 @@
           </a:p>
         </p:txBody>
       </p:sp>
+      <p:sp>
+        <p:nvSpPr>
+          <p:cNvPr id="28" name="Rectángulo 27"/>
+          <p:cNvSpPr/>
+          <p:nvPr/>
+        </p:nvSpPr>
+        <p:spPr>
+          <a:xfrm>
+            <a:off x="7907992" y="863058"/>
+            <a:ext cx="1506070" cy="497541"/>
+          </a:xfrm>
+          <a:prstGeom prst="rect">
+            <a:avLst/>
+          </a:prstGeom>
+        </p:spPr>
+        <p:style>
+          <a:lnRef idx="2">
+            <a:schemeClr val="accent1">
+              <a:shade val="50000"/>
+            </a:schemeClr>
+          </a:lnRef>
+          <a:fillRef idx="1">
+            <a:schemeClr val="accent1"/>
+          </a:fillRef>
+          <a:effectRef idx="0">
+            <a:schemeClr val="accent1"/>
+          </a:effectRef>
+          <a:fontRef idx="minor">
+            <a:schemeClr val="lt1"/>
+          </a:fontRef>
+        </p:style>
+        <p:txBody>
+          <a:bodyPr rtlCol="0" anchor="ctr"/>
+          <a:lstStyle/>
+          <a:p>
+            <a:pPr algn="ctr"/>
+            <a:r>
+              <a:rPr lang="es-ES" sz="1200" dirty="0" smtClean="0"/>
+              <a:t>&lt;&lt;</a:t>
+            </a:r>
+            <a:r>
+              <a:rPr lang="es-ES" sz="1200" dirty="0" err="1" smtClean="0"/>
+              <a:t>aggregate</a:t>
+            </a:r>
+            <a:r>
+              <a:rPr lang="es-ES" sz="1200" dirty="0" smtClean="0"/>
+              <a:t> </a:t>
+            </a:r>
+            <a:r>
+              <a:rPr lang="es-ES" sz="1200" dirty="0" err="1" smtClean="0"/>
+              <a:t>root</a:t>
+            </a:r>
+            <a:r>
+              <a:rPr lang="es-ES" sz="1200" dirty="0" smtClean="0"/>
+              <a:t>&gt;&gt;</a:t>
+            </a:r>
+          </a:p>
+          <a:p>
+            <a:pPr algn="ctr"/>
+            <a:r>
+              <a:rPr lang="es-ES" sz="1400" dirty="0" err="1" smtClean="0"/>
+              <a:t>User</a:t>
+            </a:r>
+            <a:endParaRPr lang="es-ES" sz="1400" dirty="0"/>
+          </a:p>
+        </p:txBody>
+      </p:sp>
+      <p:sp>
+        <p:nvSpPr>
+          <p:cNvPr id="29" name="Rectángulo redondeado 28"/>
+          <p:cNvSpPr/>
+          <p:nvPr/>
+        </p:nvSpPr>
+        <p:spPr>
+          <a:xfrm>
+            <a:off x="2831727" y="435205"/>
+            <a:ext cx="8329333" cy="1850791"/>
+          </a:xfrm>
+          <a:prstGeom prst="roundRect">
+            <a:avLst>
+              <a:gd name="adj" fmla="val 8059"/>
+            </a:avLst>
+          </a:prstGeom>
+          <a:noFill/>
+        </p:spPr>
+        <p:style>
+          <a:lnRef idx="2">
+            <a:schemeClr val="accent1">
+              <a:shade val="50000"/>
+            </a:schemeClr>
+          </a:lnRef>
+          <a:fillRef idx="1">
+            <a:schemeClr val="accent1"/>
+          </a:fillRef>
+          <a:effectRef idx="0">
+            <a:schemeClr val="accent1"/>
+          </a:effectRef>
+          <a:fontRef idx="minor">
+            <a:schemeClr val="lt1"/>
+          </a:fontRef>
+        </p:style>
+        <p:txBody>
+          <a:bodyPr rtlCol="0" anchor="t"/>
+          <a:lstStyle/>
+          <a:p>
+            <a:r>
+              <a:rPr lang="es-ES" sz="1400" b="1" dirty="0" smtClean="0">
+                <a:solidFill>
+                  <a:schemeClr val="tx1"/>
+                </a:solidFill>
+              </a:rPr>
+              <a:t>Aggregate: </a:t>
+            </a:r>
+            <a:r>
+              <a:rPr lang="es-ES" sz="1400" b="1" dirty="0" err="1" smtClean="0">
+                <a:solidFill>
+                  <a:schemeClr val="tx1"/>
+                </a:solidFill>
+              </a:rPr>
+              <a:t>identity</a:t>
+            </a:r>
+            <a:endParaRPr lang="es-ES" sz="1400" b="1" dirty="0">
+              <a:solidFill>
+                <a:schemeClr val="tx1"/>
+              </a:solidFill>
+            </a:endParaRPr>
+          </a:p>
+        </p:txBody>
+      </p:sp>
+      <p:sp>
+        <p:nvSpPr>
+          <p:cNvPr id="32" name="Rectángulo 31"/>
+          <p:cNvSpPr/>
+          <p:nvPr/>
+        </p:nvSpPr>
+        <p:spPr>
+          <a:xfrm>
+            <a:off x="3092824" y="862135"/>
+            <a:ext cx="1866486" cy="497541"/>
+          </a:xfrm>
+          <a:prstGeom prst="rect">
+            <a:avLst/>
+          </a:prstGeom>
+        </p:spPr>
+        <p:style>
+          <a:lnRef idx="1">
+            <a:schemeClr val="accent2"/>
+          </a:lnRef>
+          <a:fillRef idx="2">
+            <a:schemeClr val="accent2"/>
+          </a:fillRef>
+          <a:effectRef idx="1">
+            <a:schemeClr val="accent2"/>
+          </a:effectRef>
+          <a:fontRef idx="minor">
+            <a:schemeClr val="dk1"/>
+          </a:fontRef>
+        </p:style>
+        <p:txBody>
+          <a:bodyPr rtlCol="0" anchor="ctr"/>
+          <a:lstStyle/>
+          <a:p>
+            <a:pPr algn="ctr"/>
+            <a:r>
+              <a:rPr lang="es-ES" sz="1100" dirty="0" smtClean="0"/>
+              <a:t>&lt;&lt;</a:t>
+            </a:r>
+            <a:r>
+              <a:rPr lang="es-ES" sz="1100" dirty="0" err="1" smtClean="0"/>
+              <a:t>domain</a:t>
+            </a:r>
+            <a:r>
+              <a:rPr lang="es-ES" sz="1100" dirty="0" smtClean="0"/>
+              <a:t> </a:t>
+            </a:r>
+            <a:r>
+              <a:rPr lang="es-ES" sz="1100" dirty="0" err="1" smtClean="0"/>
+              <a:t>event</a:t>
+            </a:r>
+            <a:r>
+              <a:rPr lang="es-ES" sz="1100" dirty="0" smtClean="0"/>
+              <a:t>&gt;&gt;</a:t>
+            </a:r>
+          </a:p>
+          <a:p>
+            <a:pPr algn="ctr"/>
+            <a:r>
+              <a:rPr lang="es-ES" sz="1200" dirty="0" err="1" smtClean="0"/>
+              <a:t>UserEnablementChange</a:t>
+            </a:r>
+            <a:endParaRPr lang="es-ES" sz="1200" dirty="0"/>
+          </a:p>
+        </p:txBody>
+      </p:sp>
+      <p:sp>
+        <p:nvSpPr>
+          <p:cNvPr id="35" name="Rectángulo 34"/>
+          <p:cNvSpPr/>
+          <p:nvPr/>
+        </p:nvSpPr>
+        <p:spPr>
+          <a:xfrm>
+            <a:off x="7907992" y="1579964"/>
+            <a:ext cx="1506070" cy="497541"/>
+          </a:xfrm>
+          <a:prstGeom prst="rect">
+            <a:avLst/>
+          </a:prstGeom>
+        </p:spPr>
+        <p:style>
+          <a:lnRef idx="2">
+            <a:schemeClr val="accent1">
+              <a:shade val="50000"/>
+            </a:schemeClr>
+          </a:lnRef>
+          <a:fillRef idx="1">
+            <a:schemeClr val="accent1"/>
+          </a:fillRef>
+          <a:effectRef idx="0">
+            <a:schemeClr val="accent1"/>
+          </a:effectRef>
+          <a:fontRef idx="minor">
+            <a:schemeClr val="lt1"/>
+          </a:fontRef>
+        </p:style>
+        <p:txBody>
+          <a:bodyPr rtlCol="0" anchor="ctr"/>
+          <a:lstStyle/>
+          <a:p>
+            <a:pPr algn="ctr"/>
+            <a:r>
+              <a:rPr lang="es-ES" sz="1200" dirty="0" smtClean="0"/>
+              <a:t>&lt;&lt;</a:t>
+            </a:r>
+            <a:r>
+              <a:rPr lang="es-ES" sz="1200" dirty="0" err="1" smtClean="0"/>
+              <a:t>aggregate</a:t>
+            </a:r>
+            <a:r>
+              <a:rPr lang="es-ES" sz="1200" dirty="0" smtClean="0"/>
+              <a:t> </a:t>
+            </a:r>
+            <a:r>
+              <a:rPr lang="es-ES" sz="1200" dirty="0" err="1" smtClean="0"/>
+              <a:t>root</a:t>
+            </a:r>
+            <a:r>
+              <a:rPr lang="es-ES" sz="1200" dirty="0" smtClean="0"/>
+              <a:t>&gt;&gt;</a:t>
+            </a:r>
+          </a:p>
+          <a:p>
+            <a:pPr algn="ctr"/>
+            <a:r>
+              <a:rPr lang="es-ES" sz="1400" dirty="0" err="1" smtClean="0"/>
+              <a:t>Group</a:t>
+            </a:r>
+            <a:endParaRPr lang="es-ES" sz="1400" dirty="0"/>
+          </a:p>
+        </p:txBody>
+      </p:sp>
+      <p:sp>
+        <p:nvSpPr>
+          <p:cNvPr id="36" name="Rectángulo 35"/>
+          <p:cNvSpPr/>
+          <p:nvPr/>
+        </p:nvSpPr>
+        <p:spPr>
+          <a:xfrm>
+            <a:off x="9534526" y="1565381"/>
+            <a:ext cx="1506070" cy="497541"/>
+          </a:xfrm>
+          <a:prstGeom prst="rect">
+            <a:avLst/>
+          </a:prstGeom>
+        </p:spPr>
+        <p:style>
+          <a:lnRef idx="1">
+            <a:schemeClr val="accent6"/>
+          </a:lnRef>
+          <a:fillRef idx="2">
+            <a:schemeClr val="accent6"/>
+          </a:fillRef>
+          <a:effectRef idx="1">
+            <a:schemeClr val="accent6"/>
+          </a:effectRef>
+          <a:fontRef idx="minor">
+            <a:schemeClr val="dk1"/>
+          </a:fontRef>
+        </p:style>
+        <p:txBody>
+          <a:bodyPr rtlCol="0" anchor="ctr"/>
+          <a:lstStyle/>
+          <a:p>
+            <a:pPr algn="ctr"/>
+            <a:r>
+              <a:rPr lang="es-ES" sz="1200" dirty="0">
+                <a:solidFill>
+                  <a:schemeClr val="dk1"/>
+                </a:solidFill>
+              </a:rPr>
+              <a:t>&lt;&lt;</a:t>
+            </a:r>
+            <a:r>
+              <a:rPr lang="es-ES" sz="1200" dirty="0" err="1">
+                <a:solidFill>
+                  <a:schemeClr val="dk1"/>
+                </a:solidFill>
+              </a:rPr>
+              <a:t>entity</a:t>
+            </a:r>
+            <a:r>
+              <a:rPr lang="es-ES" sz="1200" dirty="0">
+                <a:solidFill>
+                  <a:schemeClr val="dk1"/>
+                </a:solidFill>
+              </a:rPr>
+              <a:t>&gt;&gt;</a:t>
+            </a:r>
+          </a:p>
+          <a:p>
+            <a:pPr algn="ctr"/>
+            <a:r>
+              <a:rPr lang="es-ES" sz="1200" dirty="0" err="1">
+                <a:solidFill>
+                  <a:schemeClr val="dk1"/>
+                </a:solidFill>
+              </a:rPr>
+              <a:t>Membership</a:t>
+            </a:r>
+            <a:endParaRPr lang="es-ES" sz="1200" dirty="0">
+              <a:solidFill>
+                <a:schemeClr val="dk1"/>
+              </a:solidFill>
+            </a:endParaRPr>
+          </a:p>
+        </p:txBody>
+      </p:sp>
+      <p:sp>
+        <p:nvSpPr>
+          <p:cNvPr id="38" name="Rectángulo 37"/>
+          <p:cNvSpPr/>
+          <p:nvPr/>
+        </p:nvSpPr>
+        <p:spPr>
+          <a:xfrm>
+            <a:off x="6263529" y="861229"/>
+            <a:ext cx="1506070" cy="497541"/>
+          </a:xfrm>
+          <a:prstGeom prst="rect">
+            <a:avLst/>
+          </a:prstGeom>
+        </p:spPr>
+        <p:style>
+          <a:lnRef idx="1">
+            <a:schemeClr val="dk1"/>
+          </a:lnRef>
+          <a:fillRef idx="2">
+            <a:schemeClr val="dk1"/>
+          </a:fillRef>
+          <a:effectRef idx="1">
+            <a:schemeClr val="dk1"/>
+          </a:effectRef>
+          <a:fontRef idx="minor">
+            <a:schemeClr val="dk1"/>
+          </a:fontRef>
+        </p:style>
+        <p:txBody>
+          <a:bodyPr rtlCol="0" anchor="ctr"/>
+          <a:lstStyle/>
+          <a:p>
+            <a:pPr algn="ctr"/>
+            <a:r>
+              <a:rPr lang="es-ES" sz="1200" dirty="0" smtClean="0"/>
+              <a:t>&lt;&lt;Repository&gt;&gt;</a:t>
+            </a:r>
+            <a:endParaRPr lang="es-ES" sz="1200" dirty="0" smtClean="0"/>
+          </a:p>
+          <a:p>
+            <a:pPr algn="ctr"/>
+            <a:r>
+              <a:rPr lang="es-ES" sz="1400" dirty="0" err="1"/>
+              <a:t>UserRepository</a:t>
+            </a:r>
+            <a:endParaRPr lang="es-ES" sz="1400" dirty="0"/>
+          </a:p>
+        </p:txBody>
+      </p:sp>
+      <p:sp>
+        <p:nvSpPr>
+          <p:cNvPr id="39" name="Rectángulo 38"/>
+          <p:cNvSpPr/>
+          <p:nvPr/>
+        </p:nvSpPr>
+        <p:spPr>
+          <a:xfrm>
+            <a:off x="3092824" y="1407165"/>
+            <a:ext cx="1866486" cy="497541"/>
+          </a:xfrm>
+          <a:prstGeom prst="rect">
+            <a:avLst/>
+          </a:prstGeom>
+        </p:spPr>
+        <p:style>
+          <a:lnRef idx="1">
+            <a:schemeClr val="accent2"/>
+          </a:lnRef>
+          <a:fillRef idx="2">
+            <a:schemeClr val="accent2"/>
+          </a:fillRef>
+          <a:effectRef idx="1">
+            <a:schemeClr val="accent2"/>
+          </a:effectRef>
+          <a:fontRef idx="minor">
+            <a:schemeClr val="dk1"/>
+          </a:fontRef>
+        </p:style>
+        <p:txBody>
+          <a:bodyPr rtlCol="0" anchor="ctr"/>
+          <a:lstStyle/>
+          <a:p>
+            <a:pPr algn="ctr"/>
+            <a:r>
+              <a:rPr lang="es-ES" sz="1100" dirty="0" smtClean="0"/>
+              <a:t>&lt;&lt;</a:t>
+            </a:r>
+            <a:r>
+              <a:rPr lang="es-ES" sz="1100" dirty="0" err="1" smtClean="0"/>
+              <a:t>domain</a:t>
+            </a:r>
+            <a:r>
+              <a:rPr lang="es-ES" sz="1100" dirty="0" smtClean="0"/>
+              <a:t> </a:t>
+            </a:r>
+            <a:r>
+              <a:rPr lang="es-ES" sz="1100" dirty="0" err="1" smtClean="0"/>
+              <a:t>event</a:t>
+            </a:r>
+            <a:r>
+              <a:rPr lang="es-ES" sz="1100" dirty="0" smtClean="0"/>
+              <a:t>&gt;&gt;</a:t>
+            </a:r>
+          </a:p>
+          <a:p>
+            <a:pPr algn="ctr"/>
+            <a:r>
+              <a:rPr lang="es-ES" sz="1200" dirty="0" err="1" smtClean="0"/>
+              <a:t>UserRegistered</a:t>
+            </a:r>
+            <a:endParaRPr lang="es-ES" sz="1200" dirty="0"/>
+          </a:p>
+        </p:txBody>
+      </p:sp>
+      <p:sp>
+        <p:nvSpPr>
+          <p:cNvPr id="40" name="Rectángulo 39"/>
+          <p:cNvSpPr/>
+          <p:nvPr/>
+        </p:nvSpPr>
+        <p:spPr>
+          <a:xfrm>
+            <a:off x="6263529" y="1573612"/>
+            <a:ext cx="1506070" cy="497541"/>
+          </a:xfrm>
+          <a:prstGeom prst="rect">
+            <a:avLst/>
+          </a:prstGeom>
+        </p:spPr>
+        <p:style>
+          <a:lnRef idx="1">
+            <a:schemeClr val="dk1"/>
+          </a:lnRef>
+          <a:fillRef idx="2">
+            <a:schemeClr val="dk1"/>
+          </a:fillRef>
+          <a:effectRef idx="1">
+            <a:schemeClr val="dk1"/>
+          </a:effectRef>
+          <a:fontRef idx="minor">
+            <a:schemeClr val="dk1"/>
+          </a:fontRef>
+        </p:style>
+        <p:txBody>
+          <a:bodyPr rtlCol="0" anchor="ctr"/>
+          <a:lstStyle/>
+          <a:p>
+            <a:pPr algn="ctr"/>
+            <a:r>
+              <a:rPr lang="es-ES" sz="1200" dirty="0">
+                <a:solidFill>
+                  <a:schemeClr val="dk1"/>
+                </a:solidFill>
+              </a:rPr>
+              <a:t>&lt;&lt;Repository&gt;&gt;</a:t>
+            </a:r>
+          </a:p>
+          <a:p>
+            <a:pPr algn="ctr"/>
+            <a:r>
+              <a:rPr lang="es-ES" sz="1200" dirty="0" err="1">
+                <a:solidFill>
+                  <a:schemeClr val="dk1"/>
+                </a:solidFill>
+              </a:rPr>
+              <a:t>GroupRepository</a:t>
+            </a:r>
+            <a:endParaRPr lang="es-ES" sz="1200" dirty="0">
+              <a:solidFill>
+                <a:schemeClr val="dk1"/>
+              </a:solidFill>
+            </a:endParaRPr>
+          </a:p>
+        </p:txBody>
+      </p:sp>
+      <p:sp>
+        <p:nvSpPr>
+          <p:cNvPr id="41" name="Rectángulo 40"/>
+          <p:cNvSpPr/>
+          <p:nvPr/>
+        </p:nvSpPr>
+        <p:spPr>
+          <a:xfrm>
+            <a:off x="3092824" y="2785990"/>
+            <a:ext cx="1866486" cy="497541"/>
+          </a:xfrm>
+          <a:prstGeom prst="rect">
+            <a:avLst/>
+          </a:prstGeom>
+        </p:spPr>
+        <p:style>
+          <a:lnRef idx="1">
+            <a:schemeClr val="dk1"/>
+          </a:lnRef>
+          <a:fillRef idx="2">
+            <a:schemeClr val="dk1"/>
+          </a:fillRef>
+          <a:effectRef idx="1">
+            <a:schemeClr val="dk1"/>
+          </a:effectRef>
+          <a:fontRef idx="minor">
+            <a:schemeClr val="dk1"/>
+          </a:fontRef>
+        </p:style>
+        <p:txBody>
+          <a:bodyPr rtlCol="0" anchor="ctr"/>
+          <a:lstStyle/>
+          <a:p>
+            <a:pPr algn="ctr"/>
+            <a:r>
+              <a:rPr lang="es-ES" sz="1200" dirty="0">
+                <a:solidFill>
+                  <a:schemeClr val="dk1"/>
+                </a:solidFill>
+              </a:rPr>
+              <a:t>&lt;&lt;Repository&gt;&gt;</a:t>
+            </a:r>
+          </a:p>
+          <a:p>
+            <a:pPr algn="ctr"/>
+            <a:r>
+              <a:rPr lang="es-ES" sz="1200" dirty="0" err="1" smtClean="0">
+                <a:solidFill>
+                  <a:schemeClr val="dk1"/>
+                </a:solidFill>
+              </a:rPr>
+              <a:t>TaskDefinitionRepository</a:t>
+            </a:r>
+            <a:endParaRPr lang="es-ES" sz="1200" dirty="0">
+              <a:solidFill>
+                <a:schemeClr val="dk1"/>
+              </a:solidFill>
+            </a:endParaRPr>
+          </a:p>
+        </p:txBody>
+      </p:sp>
     </p:spTree>
     <p:extLst>
       <p:ext uri="{BB962C8B-B14F-4D97-AF65-F5344CB8AC3E}">
@@ -4531,6 +5079,13 @@
   <p:clrMapOvr>
     <a:masterClrMapping/>
   </p:clrMapOvr>
+  <p:timing>
+    <p:tnLst>
+      <p:par>
+        <p:cTn id="1" dur="indefinite" restart="never" nodeType="tmRoot"/>
+      </p:par>
+    </p:tnLst>
+  </p:timing>
 </p:sld>
 </file>
 
@@ -4551,160 +5106,34 @@
           <a:chExt cx="0" cy="0"/>
         </a:xfrm>
       </p:grpSpPr>
-      <p:sp>
-        <p:nvSpPr>
-          <p:cNvPr id="3" name="Título 2"/>
-          <p:cNvSpPr>
-            <a:spLocks noGrp="1"/>
-          </p:cNvSpPr>
-          <p:nvPr>
-            <p:ph type="title"/>
-          </p:nvPr>
-        </p:nvSpPr>
-        <p:spPr/>
-        <p:txBody>
-          <a:bodyPr/>
-          <a:lstStyle/>
-          <a:p>
-            <a:r>
-              <a:rPr lang="es-ES" dirty="0" err="1" smtClean="0"/>
-              <a:t>Process</a:t>
-            </a:r>
-            <a:r>
-              <a:rPr lang="es-ES" dirty="0" smtClean="0"/>
-              <a:t> </a:t>
-            </a:r>
-            <a:r>
-              <a:rPr lang="es-ES" dirty="0" err="1" smtClean="0"/>
-              <a:t>Service</a:t>
-            </a:r>
-            <a:endParaRPr lang="es-ES" dirty="0"/>
-          </a:p>
-        </p:txBody>
-      </p:sp>
-      <p:graphicFrame>
-        <p:nvGraphicFramePr>
-          <p:cNvPr id="5" name="Marcador de contenido 4"/>
-          <p:cNvGraphicFramePr>
-            <a:graphicFrameLocks noGrp="1"/>
-          </p:cNvGraphicFramePr>
-          <p:nvPr>
-            <p:ph idx="1"/>
-            <p:extLst>
-              <p:ext uri="{D42A27DB-BD31-4B8C-83A1-F6EECF244321}">
-                <p14:modId xmlns:p14="http://schemas.microsoft.com/office/powerpoint/2010/main" val="1298729981"/>
-              </p:ext>
-            </p:extLst>
-          </p:nvPr>
-        </p:nvGraphicFramePr>
-        <p:xfrm>
-          <a:off x="838200" y="1825625"/>
-          <a:ext cx="10515600" cy="1112520"/>
-        </p:xfrm>
-        <a:graphic>
-          <a:graphicData uri="http://schemas.openxmlformats.org/drawingml/2006/table">
-            <a:tbl>
-              <a:tblPr firstRow="1" bandRow="1">
-                <a:tableStyleId>{5C22544A-7EE6-4342-B048-85BDC9FD1C3A}</a:tableStyleId>
-              </a:tblPr>
-              <a:tblGrid>
-                <a:gridCol w="2496671"/>
-                <a:gridCol w="8018929"/>
-              </a:tblGrid>
-              <a:tr h="370840">
-                <a:tc>
-                  <a:txBody>
-                    <a:bodyPr/>
-                    <a:lstStyle/>
-                    <a:p>
-                      <a:r>
-                        <a:rPr lang="es-ES" dirty="0" smtClean="0"/>
-                        <a:t>Operación</a:t>
-                      </a:r>
-                      <a:endParaRPr lang="es-ES" dirty="0"/>
-                    </a:p>
-                  </a:txBody>
-                  <a:tcPr/>
-                </a:tc>
-                <a:tc>
-                  <a:txBody>
-                    <a:bodyPr/>
-                    <a:lstStyle/>
-                    <a:p>
-                      <a:r>
-                        <a:rPr lang="es-ES" dirty="0" smtClean="0"/>
-                        <a:t>Descripción / propósito</a:t>
-                      </a:r>
-                      <a:endParaRPr lang="es-ES" dirty="0"/>
-                    </a:p>
-                  </a:txBody>
-                  <a:tcPr/>
-                </a:tc>
-              </a:tr>
-              <a:tr h="370840">
-                <a:tc>
-                  <a:txBody>
-                    <a:bodyPr/>
-                    <a:lstStyle/>
-                    <a:p>
-                      <a:r>
-                        <a:rPr lang="es-ES" dirty="0" err="1" smtClean="0"/>
-                        <a:t>newInstance</a:t>
-                      </a:r>
-                      <a:endParaRPr lang="es-ES" dirty="0"/>
-                    </a:p>
-                  </a:txBody>
-                  <a:tcPr/>
-                </a:tc>
-                <a:tc>
-                  <a:txBody>
-                    <a:bodyPr/>
-                    <a:lstStyle/>
-                    <a:p>
-                      <a:r>
-                        <a:rPr lang="es-ES" dirty="0" smtClean="0"/>
-                        <a:t>Permite realizar la creación de una nueva instancia de un proceso</a:t>
-                      </a:r>
-                      <a:r>
-                        <a:rPr lang="es-ES" baseline="0" dirty="0" smtClean="0"/>
-                        <a:t> de negocio.</a:t>
-                      </a:r>
-                      <a:endParaRPr lang="es-ES" dirty="0"/>
-                    </a:p>
-                  </a:txBody>
-                  <a:tcPr/>
-                </a:tc>
-              </a:tr>
-              <a:tr h="370840">
-                <a:tc>
-                  <a:txBody>
-                    <a:bodyPr/>
-                    <a:lstStyle/>
-                    <a:p>
-                      <a:endParaRPr lang="es-ES" dirty="0"/>
-                    </a:p>
-                  </a:txBody>
-                  <a:tcPr/>
-                </a:tc>
-                <a:tc>
-                  <a:txBody>
-                    <a:bodyPr/>
-                    <a:lstStyle/>
-                    <a:p>
-                      <a:endParaRPr lang="es-ES" dirty="0"/>
-                    </a:p>
-                  </a:txBody>
-                  <a:tcPr/>
-                </a:tc>
-              </a:tr>
-            </a:tbl>
-          </a:graphicData>
-        </a:graphic>
-      </p:graphicFrame>
+      <p:pic>
+        <p:nvPicPr>
+          <p:cNvPr id="3" name="Imagen 2"/>
+          <p:cNvPicPr>
+            <a:picLocks noChangeAspect="1"/>
+          </p:cNvPicPr>
+          <p:nvPr/>
+        </p:nvPicPr>
+        <p:blipFill>
+          <a:blip r:embed="rId2"/>
+          <a:stretch>
+            <a:fillRect/>
+          </a:stretch>
+        </p:blipFill>
+        <p:spPr>
+          <a:xfrm>
+            <a:off x="1223682" y="2177194"/>
+            <a:ext cx="6735765" cy="3605004"/>
+          </a:xfrm>
+          <a:prstGeom prst="rect">
+            <a:avLst/>
+          </a:prstGeom>
+        </p:spPr>
+      </p:pic>
     </p:spTree>
     <p:extLst>
       <p:ext uri="{BB962C8B-B14F-4D97-AF65-F5344CB8AC3E}">
-        <p14:creationId xmlns:p14="http://schemas.microsoft.com/office/powerpoint/2010/main" val="976514229"/>
+        <p14:creationId xmlns:p14="http://schemas.microsoft.com/office/powerpoint/2010/main" val="626849435"/>
       </p:ext>
     </p:extLst>
   </p:cSld>

</xml_diff>